<commit_message>
Unidad I comentada Luis carlos
</commit_message>
<xml_diff>
--- a/HECTOR.pptx
+++ b/HECTOR.pptx
@@ -11,10 +11,6 @@
     <p:sldId id="259" r:id="rId5"/>
     <p:sldId id="260" r:id="rId6"/>
     <p:sldId id="261" r:id="rId7"/>
-    <p:sldId id="262" r:id="rId8"/>
-    <p:sldId id="263" r:id="rId9"/>
-    <p:sldId id="264" r:id="rId10"/>
-    <p:sldId id="265" r:id="rId11"/>
   </p:sldIdLst>
   <p:sldSz cx="9144000" cy="6858000" type="screen4x3"/>
   <p:notesSz cx="6858000" cy="9144000"/>
@@ -406,7 +402,8 @@
           <a:p>
             <a:fld id="{962FF385-E468-4934-9B7D-9D43CA15E2A9}" type="datetimeFigureOut">
               <a:rPr lang="es-MX" smtClean="0"/>
-              <a:t>20/05/2015</a:t>
+              <a:pPr/>
+              <a:t>21/05/2015</a:t>
             </a:fld>
             <a:endParaRPr lang="es-MX"/>
           </a:p>
@@ -429,6 +426,7 @@
           <a:p>
             <a:fld id="{02A310FC-5D19-44ED-A3E5-40061D63B6B1}" type="slidenum">
               <a:rPr lang="es-MX" smtClean="0"/>
+              <a:pPr/>
               <a:t>‹Nº›</a:t>
             </a:fld>
             <a:endParaRPr lang="es-MX"/>
@@ -571,7 +569,8 @@
           <a:p>
             <a:fld id="{962FF385-E468-4934-9B7D-9D43CA15E2A9}" type="datetimeFigureOut">
               <a:rPr lang="es-MX" smtClean="0"/>
-              <a:t>20/05/2015</a:t>
+              <a:pPr/>
+              <a:t>21/05/2015</a:t>
             </a:fld>
             <a:endParaRPr lang="es-MX"/>
           </a:p>
@@ -613,6 +612,7 @@
           <a:p>
             <a:fld id="{02A310FC-5D19-44ED-A3E5-40061D63B6B1}" type="slidenum">
               <a:rPr lang="es-MX" smtClean="0"/>
+              <a:pPr/>
               <a:t>‹Nº›</a:t>
             </a:fld>
             <a:endParaRPr lang="es-MX"/>
@@ -746,7 +746,8 @@
           <a:p>
             <a:fld id="{962FF385-E468-4934-9B7D-9D43CA15E2A9}" type="datetimeFigureOut">
               <a:rPr lang="es-MX" smtClean="0"/>
-              <a:t>20/05/2015</a:t>
+              <a:pPr/>
+              <a:t>21/05/2015</a:t>
             </a:fld>
             <a:endParaRPr lang="es-MX"/>
           </a:p>
@@ -788,6 +789,7 @@
           <a:p>
             <a:fld id="{02A310FC-5D19-44ED-A3E5-40061D63B6B1}" type="slidenum">
               <a:rPr lang="es-MX" smtClean="0"/>
+              <a:pPr/>
               <a:t>‹Nº›</a:t>
             </a:fld>
             <a:endParaRPr lang="es-MX"/>
@@ -893,7 +895,8 @@
           <a:p>
             <a:fld id="{962FF385-E468-4934-9B7D-9D43CA15E2A9}" type="datetimeFigureOut">
               <a:rPr lang="es-MX" smtClean="0"/>
-              <a:t>20/05/2015</a:t>
+              <a:pPr/>
+              <a:t>21/05/2015</a:t>
             </a:fld>
             <a:endParaRPr lang="es-MX"/>
           </a:p>
@@ -920,6 +923,7 @@
           <a:p>
             <a:fld id="{02A310FC-5D19-44ED-A3E5-40061D63B6B1}" type="slidenum">
               <a:rPr lang="es-MX" smtClean="0"/>
+              <a:pPr/>
               <a:t>‹Nº›</a:t>
             </a:fld>
             <a:endParaRPr lang="es-MX"/>
@@ -1010,7 +1014,8 @@
           <a:p>
             <a:fld id="{962FF385-E468-4934-9B7D-9D43CA15E2A9}" type="datetimeFigureOut">
               <a:rPr lang="es-MX" smtClean="0"/>
-              <a:t>20/05/2015</a:t>
+              <a:pPr/>
+              <a:t>21/05/2015</a:t>
             </a:fld>
             <a:endParaRPr lang="es-MX"/>
           </a:p>
@@ -1052,6 +1057,7 @@
           <a:p>
             <a:fld id="{02A310FC-5D19-44ED-A3E5-40061D63B6B1}" type="slidenum">
               <a:rPr lang="es-MX" smtClean="0"/>
+              <a:pPr/>
               <a:t>‹Nº›</a:t>
             </a:fld>
             <a:endParaRPr lang="es-MX"/>
@@ -1280,7 +1286,8 @@
           <a:p>
             <a:fld id="{962FF385-E468-4934-9B7D-9D43CA15E2A9}" type="datetimeFigureOut">
               <a:rPr lang="es-MX" smtClean="0"/>
-              <a:t>20/05/2015</a:t>
+              <a:pPr/>
+              <a:t>21/05/2015</a:t>
             </a:fld>
             <a:endParaRPr lang="es-MX"/>
           </a:p>
@@ -1322,6 +1329,7 @@
           <a:p>
             <a:fld id="{02A310FC-5D19-44ED-A3E5-40061D63B6B1}" type="slidenum">
               <a:rPr lang="es-MX" smtClean="0"/>
+              <a:pPr/>
               <a:t>‹Nº›</a:t>
             </a:fld>
             <a:endParaRPr lang="es-MX"/>
@@ -1507,6 +1515,7 @@
           <a:p>
             <a:fld id="{02A310FC-5D19-44ED-A3E5-40061D63B6B1}" type="slidenum">
               <a:rPr lang="es-MX" smtClean="0"/>
+              <a:pPr/>
               <a:t>‹Nº›</a:t>
             </a:fld>
             <a:endParaRPr lang="es-MX"/>
@@ -1549,7 +1558,8 @@
           <a:p>
             <a:fld id="{962FF385-E468-4934-9B7D-9D43CA15E2A9}" type="datetimeFigureOut">
               <a:rPr lang="es-MX" smtClean="0"/>
-              <a:t>20/05/2015</a:t>
+              <a:pPr/>
+              <a:t>21/05/2015</a:t>
             </a:fld>
             <a:endParaRPr lang="es-MX"/>
           </a:p>
@@ -1996,7 +2006,8 @@
           <a:p>
             <a:fld id="{962FF385-E468-4934-9B7D-9D43CA15E2A9}" type="datetimeFigureOut">
               <a:rPr lang="es-MX" smtClean="0"/>
-              <a:t>20/05/2015</a:t>
+              <a:pPr/>
+              <a:t>21/05/2015</a:t>
             </a:fld>
             <a:endParaRPr lang="es-MX"/>
           </a:p>
@@ -2038,6 +2049,7 @@
           <a:p>
             <a:fld id="{02A310FC-5D19-44ED-A3E5-40061D63B6B1}" type="slidenum">
               <a:rPr lang="es-MX" smtClean="0"/>
+              <a:pPr/>
               <a:t>‹Nº›</a:t>
             </a:fld>
             <a:endParaRPr lang="es-MX"/>
@@ -2109,7 +2121,8 @@
           <a:p>
             <a:fld id="{962FF385-E468-4934-9B7D-9D43CA15E2A9}" type="datetimeFigureOut">
               <a:rPr lang="es-MX" smtClean="0"/>
-              <a:t>20/05/2015</a:t>
+              <a:pPr/>
+              <a:t>21/05/2015</a:t>
             </a:fld>
             <a:endParaRPr lang="es-MX"/>
           </a:p>
@@ -2151,6 +2164,7 @@
           <a:p>
             <a:fld id="{02A310FC-5D19-44ED-A3E5-40061D63B6B1}" type="slidenum">
               <a:rPr lang="es-MX" smtClean="0"/>
+              <a:pPr/>
               <a:t>‹Nº›</a:t>
             </a:fld>
             <a:endParaRPr lang="es-MX"/>
@@ -2359,7 +2373,8 @@
           <a:p>
             <a:fld id="{962FF385-E468-4934-9B7D-9D43CA15E2A9}" type="datetimeFigureOut">
               <a:rPr lang="es-MX" smtClean="0"/>
-              <a:t>20/05/2015</a:t>
+              <a:pPr/>
+              <a:t>21/05/2015</a:t>
             </a:fld>
             <a:endParaRPr lang="es-MX"/>
           </a:p>
@@ -2382,6 +2397,7 @@
           <a:p>
             <a:fld id="{02A310FC-5D19-44ED-A3E5-40061D63B6B1}" type="slidenum">
               <a:rPr lang="es-MX" smtClean="0"/>
+              <a:pPr/>
               <a:t>‹Nº›</a:t>
             </a:fld>
             <a:endParaRPr lang="es-MX"/>
@@ -2599,7 +2615,8 @@
           <a:p>
             <a:fld id="{962FF385-E468-4934-9B7D-9D43CA15E2A9}" type="datetimeFigureOut">
               <a:rPr lang="es-MX" smtClean="0"/>
-              <a:t>20/05/2015</a:t>
+              <a:pPr/>
+              <a:t>21/05/2015</a:t>
             </a:fld>
             <a:endParaRPr lang="es-MX"/>
           </a:p>
@@ -2622,6 +2639,7 @@
           <a:p>
             <a:fld id="{02A310FC-5D19-44ED-A3E5-40061D63B6B1}" type="slidenum">
               <a:rPr lang="es-MX" smtClean="0"/>
+              <a:pPr/>
               <a:t>‹Nº›</a:t>
             </a:fld>
             <a:endParaRPr lang="es-MX"/>
@@ -2772,7 +2790,8 @@
           <a:p>
             <a:fld id="{962FF385-E468-4934-9B7D-9D43CA15E2A9}" type="datetimeFigureOut">
               <a:rPr lang="es-MX" smtClean="0"/>
-              <a:t>20/05/2015</a:t>
+              <a:pPr/>
+              <a:t>21/05/2015</a:t>
             </a:fld>
             <a:endParaRPr lang="es-MX"/>
           </a:p>
@@ -2849,6 +2868,7 @@
           <a:p>
             <a:fld id="{02A310FC-5D19-44ED-A3E5-40061D63B6B1}" type="slidenum">
               <a:rPr lang="es-MX" smtClean="0"/>
+              <a:pPr/>
               <a:t>‹Nº›</a:t>
             </a:fld>
             <a:endParaRPr lang="es-MX"/>
@@ -3373,61 +3393,7 @@
     </p:spTree>
     <p:extLst>
       <p:ext uri="{BB962C8B-B14F-4D97-AF65-F5344CB8AC3E}">
-        <p14:creationId xmlns:p14="http://schemas.microsoft.com/office/powerpoint/2010/main" val="1884082685"/>
-      </p:ext>
-    </p:extLst>
-  </p:cSld>
-  <p:clrMapOvr>
-    <a:masterClrMapping/>
-  </p:clrMapOvr>
-</p:sld>
-</file>
-
-<file path=ppt/slides/slide10.xml><?xml version="1.0" encoding="utf-8"?>
-<p:sld xmlns:a="http://schemas.openxmlformats.org/drawingml/2006/main" xmlns:r="http://schemas.openxmlformats.org/officeDocument/2006/relationships" xmlns:p="http://schemas.openxmlformats.org/presentationml/2006/main">
-  <p:cSld>
-    <p:spTree>
-      <p:nvGrpSpPr>
-        <p:cNvPr id="1" name=""/>
-        <p:cNvGrpSpPr/>
-        <p:nvPr/>
-      </p:nvGrpSpPr>
-      <p:grpSpPr>
-        <a:xfrm>
-          <a:off x="0" y="0"/>
-          <a:ext cx="0" cy="0"/>
-          <a:chOff x="0" y="0"/>
-          <a:chExt cx="0" cy="0"/>
-        </a:xfrm>
-      </p:grpSpPr>
-      <p:sp>
-        <p:nvSpPr>
-          <p:cNvPr id="3" name="2 Marcador de contenido"/>
-          <p:cNvSpPr>
-            <a:spLocks noGrp="1"/>
-          </p:cNvSpPr>
-          <p:nvPr>
-            <p:ph idx="1"/>
-          </p:nvPr>
-        </p:nvSpPr>
-        <p:spPr>
-          <a:xfrm>
-            <a:off x="457200" y="332656"/>
-            <a:ext cx="8229600" cy="6192688"/>
-          </a:xfrm>
-        </p:spPr>
-        <p:txBody>
-          <a:bodyPr/>
-          <a:lstStyle/>
-          <a:p>
-            <a:endParaRPr lang="es-MX" dirty="0"/>
-          </a:p>
-        </p:txBody>
-      </p:sp>
-    </p:spTree>
-    <p:extLst>
-      <p:ext uri="{BB962C8B-B14F-4D97-AF65-F5344CB8AC3E}">
-        <p14:creationId xmlns:p14="http://schemas.microsoft.com/office/powerpoint/2010/main" val="3237410705"/>
+        <p14:creationId xmlns:p14="http://schemas.microsoft.com/office/powerpoint/2010/main" xmlns="" val="1884082685"/>
       </p:ext>
     </p:extLst>
   </p:cSld>
@@ -3498,12 +3464,12 @@
               <a:t> es el examen crítico y sistemático que realiza una persona </a:t>
             </a:r>
             <a:r>
-              <a:rPr lang="es-MX" dirty="0" err="1"/>
-              <a:t>llamese</a:t>
+              <a:rPr lang="es-MX" dirty="0" smtClean="0"/>
+              <a:t>llámese </a:t>
             </a:r>
             <a:r>
               <a:rPr lang="es-MX" dirty="0"/>
-              <a:t> auditor o grupo de personas independientes del sistema auditado, que puede ser una persona, organización, sistema, proceso, proyecto o producto.</a:t>
+              <a:t>auditor o grupo de personas independientes del sistema auditado, que puede ser una persona, organización, sistema, proceso, proyecto o producto.</a:t>
             </a:r>
           </a:p>
           <a:p>
@@ -3520,7 +3486,7 @@
     </p:spTree>
     <p:extLst>
       <p:ext uri="{BB962C8B-B14F-4D97-AF65-F5344CB8AC3E}">
-        <p14:creationId xmlns:p14="http://schemas.microsoft.com/office/powerpoint/2010/main" val="4118957701"/>
+        <p14:creationId xmlns:p14="http://schemas.microsoft.com/office/powerpoint/2010/main" xmlns="" val="4118957701"/>
       </p:ext>
     </p:extLst>
   </p:cSld>
@@ -3599,7 +3565,7 @@
     </p:spTree>
     <p:extLst>
       <p:ext uri="{BB962C8B-B14F-4D97-AF65-F5344CB8AC3E}">
-        <p14:creationId xmlns:p14="http://schemas.microsoft.com/office/powerpoint/2010/main" val="4140496846"/>
+        <p14:creationId xmlns:p14="http://schemas.microsoft.com/office/powerpoint/2010/main" xmlns="" val="4140496846"/>
       </p:ext>
     </p:extLst>
   </p:cSld>
@@ -3671,7 +3637,7 @@
     </p:spTree>
     <p:extLst>
       <p:ext uri="{BB962C8B-B14F-4D97-AF65-F5344CB8AC3E}">
-        <p14:creationId xmlns:p14="http://schemas.microsoft.com/office/powerpoint/2010/main" val="3839857548"/>
+        <p14:creationId xmlns:p14="http://schemas.microsoft.com/office/powerpoint/2010/main" xmlns="" val="3839857548"/>
       </p:ext>
     </p:extLst>
   </p:cSld>
@@ -3732,14 +3698,13 @@
               <a:rPr lang="es-MX" dirty="0"/>
               <a:t>lo cual tradicionalmente se ha asociado el término Auditoría Externa a Auditoría de Estados Financieros, lo cual como se observa no es totalmente equivalente, pues puede existir Auditoría Externa del Sistema de Información Tributario, Auditoría Externa del Sistema de Información Administrativo, Auditoría Externa del Sistema de Información Automático etc.</a:t>
             </a:r>
-            <a:endParaRPr lang="es-MX" dirty="0"/>
           </a:p>
         </p:txBody>
       </p:sp>
     </p:spTree>
     <p:extLst>
       <p:ext uri="{BB962C8B-B14F-4D97-AF65-F5344CB8AC3E}">
-        <p14:creationId xmlns:p14="http://schemas.microsoft.com/office/powerpoint/2010/main" val="2618905022"/>
+        <p14:creationId xmlns:p14="http://schemas.microsoft.com/office/powerpoint/2010/main" xmlns="" val="2618905022"/>
       </p:ext>
     </p:extLst>
   </p:cSld>
@@ -3786,6 +3751,20 @@
           <a:bodyPr/>
           <a:lstStyle/>
           <a:p>
+            <a:r>
+              <a:rPr lang="es-MX" dirty="0" smtClean="0"/>
+              <a:t>Notas Generales del Grupo:</a:t>
+            </a:r>
+          </a:p>
+          <a:p>
+            <a:r>
+              <a:rPr lang="es-MX" dirty="0" smtClean="0"/>
+              <a:t>Luis: </a:t>
+            </a:r>
+            <a:r>
+              <a:rPr lang="es-MX" smtClean="0"/>
+              <a:t>Falta completar la unidad.</a:t>
+            </a:r>
             <a:endParaRPr lang="es-MX" dirty="0"/>
           </a:p>
         </p:txBody>
@@ -3793,169 +3772,7 @@
     </p:spTree>
     <p:extLst>
       <p:ext uri="{BB962C8B-B14F-4D97-AF65-F5344CB8AC3E}">
-        <p14:creationId xmlns:p14="http://schemas.microsoft.com/office/powerpoint/2010/main" val="613389689"/>
-      </p:ext>
-    </p:extLst>
-  </p:cSld>
-  <p:clrMapOvr>
-    <a:masterClrMapping/>
-  </p:clrMapOvr>
-</p:sld>
-</file>
-
-<file path=ppt/slides/slide7.xml><?xml version="1.0" encoding="utf-8"?>
-<p:sld xmlns:a="http://schemas.openxmlformats.org/drawingml/2006/main" xmlns:r="http://schemas.openxmlformats.org/officeDocument/2006/relationships" xmlns:p="http://schemas.openxmlformats.org/presentationml/2006/main">
-  <p:cSld>
-    <p:spTree>
-      <p:nvGrpSpPr>
-        <p:cNvPr id="1" name=""/>
-        <p:cNvGrpSpPr/>
-        <p:nvPr/>
-      </p:nvGrpSpPr>
-      <p:grpSpPr>
-        <a:xfrm>
-          <a:off x="0" y="0"/>
-          <a:ext cx="0" cy="0"/>
-          <a:chOff x="0" y="0"/>
-          <a:chExt cx="0" cy="0"/>
-        </a:xfrm>
-      </p:grpSpPr>
-      <p:sp>
-        <p:nvSpPr>
-          <p:cNvPr id="3" name="2 Marcador de contenido"/>
-          <p:cNvSpPr>
-            <a:spLocks noGrp="1"/>
-          </p:cNvSpPr>
-          <p:nvPr>
-            <p:ph idx="1"/>
-          </p:nvPr>
-        </p:nvSpPr>
-        <p:spPr>
-          <a:xfrm>
-            <a:off x="457200" y="260648"/>
-            <a:ext cx="8229600" cy="6192688"/>
-          </a:xfrm>
-        </p:spPr>
-        <p:txBody>
-          <a:bodyPr/>
-          <a:lstStyle/>
-          <a:p>
-            <a:endParaRPr lang="es-MX" dirty="0"/>
-          </a:p>
-        </p:txBody>
-      </p:sp>
-    </p:spTree>
-    <p:extLst>
-      <p:ext uri="{BB962C8B-B14F-4D97-AF65-F5344CB8AC3E}">
-        <p14:creationId xmlns:p14="http://schemas.microsoft.com/office/powerpoint/2010/main" val="775348478"/>
-      </p:ext>
-    </p:extLst>
-  </p:cSld>
-  <p:clrMapOvr>
-    <a:masterClrMapping/>
-  </p:clrMapOvr>
-</p:sld>
-</file>
-
-<file path=ppt/slides/slide8.xml><?xml version="1.0" encoding="utf-8"?>
-<p:sld xmlns:a="http://schemas.openxmlformats.org/drawingml/2006/main" xmlns:r="http://schemas.openxmlformats.org/officeDocument/2006/relationships" xmlns:p="http://schemas.openxmlformats.org/presentationml/2006/main">
-  <p:cSld>
-    <p:spTree>
-      <p:nvGrpSpPr>
-        <p:cNvPr id="1" name=""/>
-        <p:cNvGrpSpPr/>
-        <p:nvPr/>
-      </p:nvGrpSpPr>
-      <p:grpSpPr>
-        <a:xfrm>
-          <a:off x="0" y="0"/>
-          <a:ext cx="0" cy="0"/>
-          <a:chOff x="0" y="0"/>
-          <a:chExt cx="0" cy="0"/>
-        </a:xfrm>
-      </p:grpSpPr>
-      <p:sp>
-        <p:nvSpPr>
-          <p:cNvPr id="3" name="2 Marcador de contenido"/>
-          <p:cNvSpPr>
-            <a:spLocks noGrp="1"/>
-          </p:cNvSpPr>
-          <p:nvPr>
-            <p:ph idx="1"/>
-          </p:nvPr>
-        </p:nvSpPr>
-        <p:spPr>
-          <a:xfrm>
-            <a:off x="457200" y="260648"/>
-            <a:ext cx="8229600" cy="6264696"/>
-          </a:xfrm>
-        </p:spPr>
-        <p:txBody>
-          <a:bodyPr/>
-          <a:lstStyle/>
-          <a:p>
-            <a:endParaRPr lang="es-MX" dirty="0"/>
-          </a:p>
-        </p:txBody>
-      </p:sp>
-    </p:spTree>
-    <p:extLst>
-      <p:ext uri="{BB962C8B-B14F-4D97-AF65-F5344CB8AC3E}">
-        <p14:creationId xmlns:p14="http://schemas.microsoft.com/office/powerpoint/2010/main" val="686276675"/>
-      </p:ext>
-    </p:extLst>
-  </p:cSld>
-  <p:clrMapOvr>
-    <a:masterClrMapping/>
-  </p:clrMapOvr>
-</p:sld>
-</file>
-
-<file path=ppt/slides/slide9.xml><?xml version="1.0" encoding="utf-8"?>
-<p:sld xmlns:a="http://schemas.openxmlformats.org/drawingml/2006/main" xmlns:r="http://schemas.openxmlformats.org/officeDocument/2006/relationships" xmlns:p="http://schemas.openxmlformats.org/presentationml/2006/main">
-  <p:cSld>
-    <p:spTree>
-      <p:nvGrpSpPr>
-        <p:cNvPr id="1" name=""/>
-        <p:cNvGrpSpPr/>
-        <p:nvPr/>
-      </p:nvGrpSpPr>
-      <p:grpSpPr>
-        <a:xfrm>
-          <a:off x="0" y="0"/>
-          <a:ext cx="0" cy="0"/>
-          <a:chOff x="0" y="0"/>
-          <a:chExt cx="0" cy="0"/>
-        </a:xfrm>
-      </p:grpSpPr>
-      <p:sp>
-        <p:nvSpPr>
-          <p:cNvPr id="3" name="2 Marcador de contenido"/>
-          <p:cNvSpPr>
-            <a:spLocks noGrp="1"/>
-          </p:cNvSpPr>
-          <p:nvPr>
-            <p:ph idx="1"/>
-          </p:nvPr>
-        </p:nvSpPr>
-        <p:spPr>
-          <a:xfrm>
-            <a:off x="457200" y="332656"/>
-            <a:ext cx="8229600" cy="6120680"/>
-          </a:xfrm>
-        </p:spPr>
-        <p:txBody>
-          <a:bodyPr/>
-          <a:lstStyle/>
-          <a:p>
-            <a:endParaRPr lang="es-MX" dirty="0"/>
-          </a:p>
-        </p:txBody>
-      </p:sp>
-    </p:spTree>
-    <p:extLst>
-      <p:ext uri="{BB962C8B-B14F-4D97-AF65-F5344CB8AC3E}">
-        <p14:creationId xmlns:p14="http://schemas.microsoft.com/office/powerpoint/2010/main" val="633716904"/>
+        <p14:creationId xmlns:p14="http://schemas.microsoft.com/office/powerpoint/2010/main" xmlns="" val="613389689"/>
       </p:ext>
     </p:extLst>
   </p:cSld>

</xml_diff>

<commit_message>
Unidad I Comentarios Oscar
</commit_message>
<xml_diff>
--- a/HECTOR.pptx
+++ b/HECTOR.pptx
@@ -3393,7 +3393,7 @@
     </p:spTree>
     <p:extLst>
       <p:ext uri="{BB962C8B-B14F-4D97-AF65-F5344CB8AC3E}">
-        <p14:creationId xmlns:p14="http://schemas.microsoft.com/office/powerpoint/2010/main" xmlns="" val="1884082685"/>
+        <p14:creationId xmlns:p14="http://schemas.microsoft.com/office/powerpoint/2010/main" val="1884082685"/>
       </p:ext>
     </p:extLst>
   </p:cSld>
@@ -3486,7 +3486,7 @@
     </p:spTree>
     <p:extLst>
       <p:ext uri="{BB962C8B-B14F-4D97-AF65-F5344CB8AC3E}">
-        <p14:creationId xmlns:p14="http://schemas.microsoft.com/office/powerpoint/2010/main" xmlns="" val="4118957701"/>
+        <p14:creationId xmlns:p14="http://schemas.microsoft.com/office/powerpoint/2010/main" val="4118957701"/>
       </p:ext>
     </p:extLst>
   </p:cSld>
@@ -3565,7 +3565,7 @@
     </p:spTree>
     <p:extLst>
       <p:ext uri="{BB962C8B-B14F-4D97-AF65-F5344CB8AC3E}">
-        <p14:creationId xmlns:p14="http://schemas.microsoft.com/office/powerpoint/2010/main" xmlns="" val="4140496846"/>
+        <p14:creationId xmlns:p14="http://schemas.microsoft.com/office/powerpoint/2010/main" val="4140496846"/>
       </p:ext>
     </p:extLst>
   </p:cSld>
@@ -3637,7 +3637,7 @@
     </p:spTree>
     <p:extLst>
       <p:ext uri="{BB962C8B-B14F-4D97-AF65-F5344CB8AC3E}">
-        <p14:creationId xmlns:p14="http://schemas.microsoft.com/office/powerpoint/2010/main" xmlns="" val="3839857548"/>
+        <p14:creationId xmlns:p14="http://schemas.microsoft.com/office/powerpoint/2010/main" val="3839857548"/>
       </p:ext>
     </p:extLst>
   </p:cSld>
@@ -3704,7 +3704,7 @@
     </p:spTree>
     <p:extLst>
       <p:ext uri="{BB962C8B-B14F-4D97-AF65-F5344CB8AC3E}">
-        <p14:creationId xmlns:p14="http://schemas.microsoft.com/office/powerpoint/2010/main" xmlns="" val="2618905022"/>
+        <p14:creationId xmlns:p14="http://schemas.microsoft.com/office/powerpoint/2010/main" val="2618905022"/>
       </p:ext>
     </p:extLst>
   </p:cSld>
@@ -3758,12 +3758,43 @@
           </a:p>
           <a:p>
             <a:r>
+              <a:rPr lang="es-MX" dirty="0" smtClean="0">
+                <a:solidFill>
+                  <a:srgbClr val="FF0000"/>
+                </a:solidFill>
+              </a:rPr>
+              <a:t>Luis: </a:t>
+            </a:r>
+            <a:r>
               <a:rPr lang="es-MX" dirty="0" smtClean="0"/>
-              <a:t>Luis: </a:t>
-            </a:r>
-            <a:r>
-              <a:rPr lang="es-MX" smtClean="0"/>
-              <a:t>Falta completar la unidad.</a:t>
+              <a:t>Falta completar la unidad</a:t>
+            </a:r>
+            <a:r>
+              <a:rPr lang="es-MX" dirty="0" smtClean="0"/>
+              <a:t>.</a:t>
+            </a:r>
+          </a:p>
+          <a:p>
+            <a:r>
+              <a:rPr lang="es-MX" dirty="0" smtClean="0">
+                <a:solidFill>
+                  <a:srgbClr val="FF0000"/>
+                </a:solidFill>
+              </a:rPr>
+              <a:t>Oscar: </a:t>
+            </a:r>
+            <a:r>
+              <a:rPr lang="es-MX" dirty="0" smtClean="0"/>
+              <a:t>Creo que está bien. Sin embargo</a:t>
+            </a:r>
+          </a:p>
+          <a:p>
+            <a:pPr marL="0" indent="0">
+              <a:buNone/>
+            </a:pPr>
+            <a:r>
+              <a:rPr lang="es-MX" dirty="0" smtClean="0"/>
+              <a:t>   Se debe enfocar a Auditoría Informática</a:t>
             </a:r>
             <a:endParaRPr lang="es-MX" dirty="0"/>
           </a:p>
@@ -3772,7 +3803,7 @@
     </p:spTree>
     <p:extLst>
       <p:ext uri="{BB962C8B-B14F-4D97-AF65-F5344CB8AC3E}">
-        <p14:creationId xmlns:p14="http://schemas.microsoft.com/office/powerpoint/2010/main" xmlns="" val="613389689"/>
+        <p14:creationId xmlns:p14="http://schemas.microsoft.com/office/powerpoint/2010/main" val="613389689"/>
       </p:ext>
     </p:extLst>
   </p:cSld>

</xml_diff>

<commit_message>
Comentarios en archivo HECTOR
</commit_message>
<xml_diff>
--- a/HECTOR.pptx
+++ b/HECTOR.pptx
@@ -116,6 +116,22 @@
       </a:defRPr>
     </a:lvl9pPr>
   </p:defaultTextStyle>
+  <p:extLst>
+    <p:ext uri="{EFAFB233-063F-42B5-8137-9DF3F51BA10A}">
+      <p15:sldGuideLst xmlns:p15="http://schemas.microsoft.com/office/powerpoint/2012/main">
+        <p15:guide id="1" orient="horz" pos="2160">
+          <p15:clr>
+            <a:srgbClr val="A4A3A4"/>
+          </p15:clr>
+        </p15:guide>
+        <p15:guide id="2" pos="2880">
+          <p15:clr>
+            <a:srgbClr val="A4A3A4"/>
+          </p15:clr>
+        </p15:guide>
+      </p15:sldGuideLst>
+    </p:ext>
+  </p:extLst>
 </p:presentation>
 </file>
 
@@ -3407,6 +3423,13 @@
   <p:clrMapOvr>
     <a:masterClrMapping/>
   </p:clrMapOvr>
+  <p:timing>
+    <p:tnLst>
+      <p:par>
+        <p:cTn id="1" dur="indefinite" restart="never" nodeType="tmRoot"/>
+      </p:par>
+    </p:tnLst>
+  </p:timing>
 </p:sld>
 </file>
 
@@ -3541,6 +3564,13 @@
   <p:clrMapOvr>
     <a:masterClrMapping/>
   </p:clrMapOvr>
+  <p:timing>
+    <p:tnLst>
+      <p:par>
+        <p:cTn id="1" dur="indefinite" restart="never" nodeType="tmRoot"/>
+      </p:par>
+    </p:tnLst>
+  </p:timing>
 </p:sld>
 </file>
 
@@ -3624,6 +3654,13 @@
   <p:clrMapOvr>
     <a:masterClrMapping/>
   </p:clrMapOvr>
+  <p:timing>
+    <p:tnLst>
+      <p:par>
+        <p:cTn id="1" dur="indefinite" restart="never" nodeType="tmRoot"/>
+      </p:par>
+    </p:tnLst>
+  </p:timing>
 </p:sld>
 </file>
 
@@ -3800,6 +3837,13 @@
   <p:clrMapOvr>
     <a:masterClrMapping/>
   </p:clrMapOvr>
+  <p:timing>
+    <p:tnLst>
+      <p:par>
+        <p:cTn id="1" dur="indefinite" restart="never" nodeType="tmRoot"/>
+      </p:par>
+    </p:tnLst>
+  </p:timing>
 </p:sld>
 </file>
 
@@ -3838,7 +3882,7 @@
         </p:spPr>
         <p:txBody>
           <a:bodyPr>
-            <a:normAutofit lnSpcReduction="10000"/>
+            <a:normAutofit fontScale="92500" lnSpcReduction="10000"/>
           </a:bodyPr>
           <a:lstStyle/>
           <a:p>
@@ -3967,17 +4011,12 @@
             </a:r>
             <a:r>
               <a:rPr lang="es-MX" dirty="0"/>
-              <a:t>muy importantes </a:t>
-            </a:r>
-            <a:r>
-              <a:rPr lang="es-MX"/>
-              <a:t>los </a:t>
-            </a:r>
-            <a:r>
-              <a:rPr lang="es-MX" smtClean="0"/>
+              <a:t>muy importantes los </a:t>
+            </a:r>
+            <a:r>
+              <a:rPr lang="es-MX" dirty="0" smtClean="0"/>
               <a:t>temas compañero</a:t>
             </a:r>
-            <a:endParaRPr lang="es-MX" dirty="0" smtClean="0"/>
           </a:p>
           <a:p>
             <a:r>
@@ -4006,7 +4045,41 @@
             </a:r>
             <a:r>
               <a:rPr lang="es-MX" dirty="0" smtClean="0"/>
-              <a:t> planteada.</a:t>
+              <a:t> planteada</a:t>
+            </a:r>
+            <a:r>
+              <a:rPr lang="es-MX" dirty="0" smtClean="0"/>
+              <a:t>.</a:t>
+            </a:r>
+          </a:p>
+          <a:p>
+            <a:r>
+              <a:rPr lang="es-MX" dirty="0" smtClean="0">
+                <a:solidFill>
+                  <a:srgbClr val="FF0000"/>
+                </a:solidFill>
+              </a:rPr>
+              <a:t>Javier Lizárraga</a:t>
+            </a:r>
+            <a:r>
+              <a:rPr lang="es-MX" dirty="0" smtClean="0">
+                <a:solidFill>
+                  <a:srgbClr val="FF0000"/>
+                </a:solidFill>
+              </a:rPr>
+              <a:t>:</a:t>
+            </a:r>
+            <a:r>
+              <a:rPr lang="es-MX" dirty="0" smtClean="0"/>
+              <a:t> Muy </a:t>
+            </a:r>
+            <a:r>
+              <a:rPr lang="es-MX" smtClean="0"/>
+              <a:t>bien Héctor, </a:t>
+            </a:r>
+            <a:r>
+              <a:rPr lang="es-MX" dirty="0" smtClean="0"/>
+              <a:t>bastante información  podemos enfocarla a la auditoria informática.</a:t>
             </a:r>
             <a:endParaRPr lang="es-MX" dirty="0"/>
           </a:p>
@@ -4039,6 +4112,13 @@
   <p:clrMapOvr>
     <a:masterClrMapping/>
   </p:clrMapOvr>
+  <p:timing>
+    <p:tnLst>
+      <p:par>
+        <p:cTn id="1" dur="indefinite" restart="never" nodeType="tmRoot"/>
+      </p:par>
+    </p:tnLst>
+  </p:timing>
 </p:sld>
 </file>
 
@@ -4192,6 +4272,13 @@
   <p:clrMapOvr>
     <a:masterClrMapping/>
   </p:clrMapOvr>
+  <p:timing>
+    <p:tnLst>
+      <p:par>
+        <p:cTn id="1" dur="indefinite" restart="never" nodeType="tmRoot"/>
+      </p:par>
+    </p:tnLst>
+  </p:timing>
 </p:sld>
 </file>
 
@@ -4340,6 +4427,13 @@
   <p:clrMapOvr>
     <a:masterClrMapping/>
   </p:clrMapOvr>
+  <p:timing>
+    <p:tnLst>
+      <p:par>
+        <p:cTn id="1" dur="indefinite" restart="never" nodeType="tmRoot"/>
+      </p:par>
+    </p:tnLst>
+  </p:timing>
 </p:sld>
 </file>
 
@@ -4464,6 +4558,13 @@
   <p:clrMapOvr>
     <a:masterClrMapping/>
   </p:clrMapOvr>
+  <p:timing>
+    <p:tnLst>
+      <p:par>
+        <p:cTn id="1" dur="indefinite" restart="never" nodeType="tmRoot"/>
+      </p:par>
+    </p:tnLst>
+  </p:timing>
 </p:sld>
 </file>
 
@@ -4583,6 +4684,13 @@
   <p:clrMapOvr>
     <a:masterClrMapping/>
   </p:clrMapOvr>
+  <p:timing>
+    <p:tnLst>
+      <p:par>
+        <p:cTn id="1" dur="indefinite" restart="never" nodeType="tmRoot"/>
+      </p:par>
+    </p:tnLst>
+  </p:timing>
 </p:sld>
 </file>
 
@@ -4740,6 +4848,13 @@
   <p:clrMapOvr>
     <a:masterClrMapping/>
   </p:clrMapOvr>
+  <p:timing>
+    <p:tnLst>
+      <p:par>
+        <p:cTn id="1" dur="indefinite" restart="never" nodeType="tmRoot"/>
+      </p:par>
+    </p:tnLst>
+  </p:timing>
 </p:sld>
 </file>
 
@@ -4879,6 +4994,13 @@
   <p:clrMapOvr>
     <a:masterClrMapping/>
   </p:clrMapOvr>
+  <p:timing>
+    <p:tnLst>
+      <p:par>
+        <p:cTn id="1" dur="indefinite" restart="never" nodeType="tmRoot"/>
+      </p:par>
+    </p:tnLst>
+  </p:timing>
 </p:sld>
 </file>
 
@@ -5013,6 +5135,13 @@
   <p:clrMapOvr>
     <a:masterClrMapping/>
   </p:clrMapOvr>
+  <p:timing>
+    <p:tnLst>
+      <p:par>
+        <p:cTn id="1" dur="indefinite" restart="never" nodeType="tmRoot"/>
+      </p:par>
+    </p:tnLst>
+  </p:timing>
 </p:sld>
 </file>
 
@@ -5168,6 +5297,13 @@
   <p:clrMapOvr>
     <a:masterClrMapping/>
   </p:clrMapOvr>
+  <p:timing>
+    <p:tnLst>
+      <p:par>
+        <p:cTn id="1" dur="indefinite" restart="never" nodeType="tmRoot"/>
+      </p:par>
+    </p:tnLst>
+  </p:timing>
 </p:sld>
 </file>
 

</xml_diff>